<commit_message>
Finished one hot encoding
</commit_message>
<xml_diff>
--- a/Data Preparation/slides/MSA-2021-introduction-to-data-science-data-preparation.pptx
+++ b/Data Preparation/slides/MSA-2021-introduction-to-data-science-data-preparation.pptx
@@ -5,7 +5,7 @@
     <p:sldMasterId id="2147483648" r:id="rId1"/>
   </p:sldMasterIdLst>
   <p:notesMasterIdLst>
-    <p:notesMasterId r:id="rId16"/>
+    <p:notesMasterId r:id="rId17"/>
   </p:notesMasterIdLst>
   <p:sldIdLst>
     <p:sldId id="278" r:id="rId2"/>
@@ -21,7 +21,8 @@
     <p:sldId id="291" r:id="rId12"/>
     <p:sldId id="292" r:id="rId13"/>
     <p:sldId id="293" r:id="rId14"/>
-    <p:sldId id="283" r:id="rId15"/>
+    <p:sldId id="294" r:id="rId15"/>
+    <p:sldId id="283" r:id="rId16"/>
   </p:sldIdLst>
   <p:sldSz cx="12192000" cy="6858000"/>
   <p:notesSz cx="6858000" cy="9144000"/>
@@ -5975,7 +5976,7 @@
           <a:p>
             <a:fld id="{53D551F1-3E25-2744-9BE7-0A04F579F8FB}" type="datetimeFigureOut">
               <a:rPr lang="en-US" smtClean="0"/>
-              <a:t>4/28/2021</a:t>
+              <a:t>4/30/2021</a:t>
             </a:fld>
             <a:endParaRPr lang="en-US"/>
           </a:p>
@@ -8077,7 +8078,7 @@
           <a:p>
             <a:fld id="{F4356D17-FE2B-4A42-AE6B-E0B8894B79EA}" type="datetimeFigureOut">
               <a:rPr lang="en-US" smtClean="0"/>
-              <a:t>4/28/2021</a:t>
+              <a:t>4/30/2021</a:t>
             </a:fld>
             <a:endParaRPr lang="en-US"/>
           </a:p>
@@ -8247,7 +8248,7 @@
           <a:p>
             <a:fld id="{F4356D17-FE2B-4A42-AE6B-E0B8894B79EA}" type="datetimeFigureOut">
               <a:rPr lang="en-US" smtClean="0"/>
-              <a:t>4/28/2021</a:t>
+              <a:t>4/30/2021</a:t>
             </a:fld>
             <a:endParaRPr lang="en-US"/>
           </a:p>
@@ -8427,7 +8428,7 @@
           <a:p>
             <a:fld id="{F4356D17-FE2B-4A42-AE6B-E0B8894B79EA}" type="datetimeFigureOut">
               <a:rPr lang="en-US" smtClean="0"/>
-              <a:t>4/28/2021</a:t>
+              <a:t>4/30/2021</a:t>
             </a:fld>
             <a:endParaRPr lang="en-US"/>
           </a:p>
@@ -8779,7 +8780,7 @@
           <a:p>
             <a:fld id="{F4356D17-FE2B-4A42-AE6B-E0B8894B79EA}" type="datetimeFigureOut">
               <a:rPr lang="en-US" smtClean="0"/>
-              <a:t>4/28/2021</a:t>
+              <a:t>4/30/2021</a:t>
             </a:fld>
             <a:endParaRPr lang="en-US"/>
           </a:p>
@@ -9025,7 +9026,7 @@
           <a:p>
             <a:fld id="{F4356D17-FE2B-4A42-AE6B-E0B8894B79EA}" type="datetimeFigureOut">
               <a:rPr lang="en-US" smtClean="0"/>
-              <a:t>4/28/2021</a:t>
+              <a:t>4/30/2021</a:t>
             </a:fld>
             <a:endParaRPr lang="en-US"/>
           </a:p>
@@ -9257,7 +9258,7 @@
           <a:p>
             <a:fld id="{F4356D17-FE2B-4A42-AE6B-E0B8894B79EA}" type="datetimeFigureOut">
               <a:rPr lang="en-US" smtClean="0"/>
-              <a:t>4/28/2021</a:t>
+              <a:t>4/30/2021</a:t>
             </a:fld>
             <a:endParaRPr lang="en-US"/>
           </a:p>
@@ -9624,7 +9625,7 @@
           <a:p>
             <a:fld id="{F4356D17-FE2B-4A42-AE6B-E0B8894B79EA}" type="datetimeFigureOut">
               <a:rPr lang="en-US" smtClean="0"/>
-              <a:t>4/28/2021</a:t>
+              <a:t>4/30/2021</a:t>
             </a:fld>
             <a:endParaRPr lang="en-US"/>
           </a:p>
@@ -9742,7 +9743,7 @@
           <a:p>
             <a:fld id="{F4356D17-FE2B-4A42-AE6B-E0B8894B79EA}" type="datetimeFigureOut">
               <a:rPr lang="en-US" smtClean="0"/>
-              <a:t>4/28/2021</a:t>
+              <a:t>4/30/2021</a:t>
             </a:fld>
             <a:endParaRPr lang="en-US"/>
           </a:p>
@@ -9837,7 +9838,7 @@
           <a:p>
             <a:fld id="{F4356D17-FE2B-4A42-AE6B-E0B8894B79EA}" type="datetimeFigureOut">
               <a:rPr lang="en-US" smtClean="0"/>
-              <a:t>4/28/2021</a:t>
+              <a:t>4/30/2021</a:t>
             </a:fld>
             <a:endParaRPr lang="en-US"/>
           </a:p>
@@ -10114,7 +10115,7 @@
           <a:p>
             <a:fld id="{F4356D17-FE2B-4A42-AE6B-E0B8894B79EA}" type="datetimeFigureOut">
               <a:rPr lang="en-US" smtClean="0"/>
-              <a:t>4/28/2021</a:t>
+              <a:t>4/30/2021</a:t>
             </a:fld>
             <a:endParaRPr lang="en-US"/>
           </a:p>
@@ -10367,7 +10368,7 @@
           <a:p>
             <a:fld id="{F4356D17-FE2B-4A42-AE6B-E0B8894B79EA}" type="datetimeFigureOut">
               <a:rPr lang="en-US" smtClean="0"/>
-              <a:t>4/28/2021</a:t>
+              <a:t>4/30/2021</a:t>
             </a:fld>
             <a:endParaRPr lang="en-US"/>
           </a:p>
@@ -10580,7 +10581,7 @@
           <a:p>
             <a:fld id="{F4356D17-FE2B-4A42-AE6B-E0B8894B79EA}" type="datetimeFigureOut">
               <a:rPr lang="en-US" smtClean="0"/>
-              <a:t>4/28/2021</a:t>
+              <a:t>4/30/2021</a:t>
             </a:fld>
             <a:endParaRPr lang="en-US"/>
           </a:p>
@@ -12617,7 +12618,7 @@
         <p:spPr>
           <a:xfrm>
             <a:off x="5327921" y="253484"/>
-            <a:ext cx="2044149" cy="369332"/>
+            <a:ext cx="2000869" cy="369332"/>
           </a:xfrm>
           <a:prstGeom prst="rect">
             <a:avLst/>
@@ -12634,7 +12635,7 @@
                 <a:latin typeface="Segoe UI Light" panose="020B0502040204020203" pitchFamily="34" charset="0"/>
                 <a:cs typeface="Segoe UI Light" panose="020B0502040204020203" pitchFamily="34" charset="0"/>
               </a:rPr>
-              <a:t>One-hot encoding </a:t>
+              <a:t>Encoding Methods</a:t>
             </a:r>
           </a:p>
         </p:txBody>
@@ -13308,6 +13309,228 @@
 </file>
 
 <file path=ppt/slides/slide14.xml><?xml version="1.0" encoding="utf-8"?>
+<p:sld xmlns:a="http://schemas.openxmlformats.org/drawingml/2006/main" xmlns:r="http://schemas.openxmlformats.org/officeDocument/2006/relationships" xmlns:p="http://schemas.openxmlformats.org/presentationml/2006/main">
+  <p:cSld>
+    <p:spTree>
+      <p:nvGrpSpPr>
+        <p:cNvPr id="1" name=""/>
+        <p:cNvGrpSpPr/>
+        <p:nvPr/>
+      </p:nvGrpSpPr>
+      <p:grpSpPr>
+        <a:xfrm>
+          <a:off x="0" y="0"/>
+          <a:ext cx="0" cy="0"/>
+          <a:chOff x="0" y="0"/>
+          <a:chExt cx="0" cy="0"/>
+        </a:xfrm>
+      </p:grpSpPr>
+      <p:sp>
+        <p:nvSpPr>
+          <p:cNvPr id="2" name="Title 1">
+            <a:extLst>
+              <a:ext uri="{FF2B5EF4-FFF2-40B4-BE49-F238E27FC236}">
+                <a16:creationId xmlns:a16="http://schemas.microsoft.com/office/drawing/2014/main" id="{8CC2114F-86FD-4BFC-9A62-3547A6C5C4F6}"/>
+              </a:ext>
+            </a:extLst>
+          </p:cNvPr>
+          <p:cNvSpPr>
+            <a:spLocks noGrp="1"/>
+          </p:cNvSpPr>
+          <p:nvPr>
+            <p:ph type="title"/>
+          </p:nvPr>
+        </p:nvSpPr>
+        <p:spPr/>
+        <p:txBody>
+          <a:bodyPr/>
+          <a:lstStyle/>
+          <a:p>
+            <a:r>
+              <a:rPr lang="en-US" dirty="0">
+                <a:latin typeface="Segoe UI Semilight" panose="020B0402040204020203" pitchFamily="34" charset="0"/>
+                <a:cs typeface="Segoe UI Semilight" panose="020B0402040204020203" pitchFamily="34" charset="0"/>
+              </a:rPr>
+              <a:t>Encoding Methods</a:t>
+            </a:r>
+            <a:endParaRPr lang="en-NZ" dirty="0">
+              <a:latin typeface="Segoe UI Semilight" panose="020B0402040204020203" pitchFamily="34" charset="0"/>
+              <a:cs typeface="Segoe UI Semilight" panose="020B0402040204020203" pitchFamily="34" charset="0"/>
+            </a:endParaRPr>
+          </a:p>
+        </p:txBody>
+      </p:sp>
+      <p:sp>
+        <p:nvSpPr>
+          <p:cNvPr id="9" name="Text Placeholder 8">
+            <a:extLst>
+              <a:ext uri="{FF2B5EF4-FFF2-40B4-BE49-F238E27FC236}">
+                <a16:creationId xmlns:a16="http://schemas.microsoft.com/office/drawing/2014/main" id="{DA26A583-C759-4C17-B5B3-92B57B848196}"/>
+              </a:ext>
+            </a:extLst>
+          </p:cNvPr>
+          <p:cNvSpPr>
+            <a:spLocks noGrp="1"/>
+          </p:cNvSpPr>
+          <p:nvPr>
+            <p:ph type="body" idx="1"/>
+          </p:nvPr>
+        </p:nvSpPr>
+        <p:spPr/>
+        <p:txBody>
+          <a:bodyPr/>
+          <a:lstStyle/>
+          <a:p>
+            <a:r>
+              <a:rPr lang="en-US" b="0" dirty="0">
+                <a:latin typeface="Segoe UI Semilight" panose="020B0402040204020203" pitchFamily="34" charset="0"/>
+                <a:cs typeface="Segoe UI Semilight" panose="020B0402040204020203" pitchFamily="34" charset="0"/>
+              </a:rPr>
+              <a:t>One-Hot </a:t>
+            </a:r>
+            <a:r>
+              <a:rPr lang="en-US" b="0">
+                <a:latin typeface="Segoe UI Semilight" panose="020B0402040204020203" pitchFamily="34" charset="0"/>
+                <a:cs typeface="Segoe UI Semilight" panose="020B0402040204020203" pitchFamily="34" charset="0"/>
+              </a:rPr>
+              <a:t>Encoding – Nominal Data</a:t>
+            </a:r>
+            <a:endParaRPr lang="en-NZ" b="0" dirty="0">
+              <a:latin typeface="Segoe UI Semilight" panose="020B0402040204020203" pitchFamily="34" charset="0"/>
+              <a:cs typeface="Segoe UI Semilight" panose="020B0402040204020203" pitchFamily="34" charset="0"/>
+            </a:endParaRPr>
+          </a:p>
+        </p:txBody>
+      </p:sp>
+      <p:sp>
+        <p:nvSpPr>
+          <p:cNvPr id="11" name="Text Placeholder 10">
+            <a:extLst>
+              <a:ext uri="{FF2B5EF4-FFF2-40B4-BE49-F238E27FC236}">
+                <a16:creationId xmlns:a16="http://schemas.microsoft.com/office/drawing/2014/main" id="{A8858324-0995-4081-8E6E-D212579CF9CE}"/>
+              </a:ext>
+            </a:extLst>
+          </p:cNvPr>
+          <p:cNvSpPr>
+            <a:spLocks noGrp="1"/>
+          </p:cNvSpPr>
+          <p:nvPr>
+            <p:ph type="body" sz="quarter" idx="3"/>
+          </p:nvPr>
+        </p:nvSpPr>
+        <p:spPr/>
+        <p:txBody>
+          <a:bodyPr/>
+          <a:lstStyle/>
+          <a:p>
+            <a:r>
+              <a:rPr lang="en-US" b="0" dirty="0">
+                <a:latin typeface="Segoe UI Semilight" panose="020B0402040204020203" pitchFamily="34" charset="0"/>
+                <a:cs typeface="Segoe UI Semilight" panose="020B0402040204020203" pitchFamily="34" charset="0"/>
+              </a:rPr>
+              <a:t>Label Encoding – Ordinal Data</a:t>
+            </a:r>
+            <a:endParaRPr lang="en-NZ" b="0" dirty="0">
+              <a:latin typeface="Segoe UI Semilight" panose="020B0402040204020203" pitchFamily="34" charset="0"/>
+              <a:cs typeface="Segoe UI Semilight" panose="020B0402040204020203" pitchFamily="34" charset="0"/>
+            </a:endParaRPr>
+          </a:p>
+        </p:txBody>
+      </p:sp>
+      <p:pic>
+        <p:nvPicPr>
+          <p:cNvPr id="13" name="Content Placeholder 12">
+            <a:extLst>
+              <a:ext uri="{FF2B5EF4-FFF2-40B4-BE49-F238E27FC236}">
+                <a16:creationId xmlns:a16="http://schemas.microsoft.com/office/drawing/2014/main" id="{3027A527-8BFD-452C-9439-66C9A447187C}"/>
+              </a:ext>
+            </a:extLst>
+          </p:cNvPr>
+          <p:cNvPicPr>
+            <a:picLocks noGrp="1" noChangeAspect="1"/>
+          </p:cNvPicPr>
+          <p:nvPr>
+            <p:ph sz="half" idx="2"/>
+          </p:nvPr>
+        </p:nvPicPr>
+        <p:blipFill rotWithShape="1">
+          <a:blip r:embed="rId2"/>
+          <a:srcRect l="17105" r="16881"/>
+          <a:stretch/>
+        </p:blipFill>
+        <p:spPr>
+          <a:xfrm>
+            <a:off x="839788" y="3106160"/>
+            <a:ext cx="5157787" cy="2482417"/>
+          </a:xfrm>
+          <a:prstGeom prst="rect">
+            <a:avLst/>
+          </a:prstGeom>
+        </p:spPr>
+      </p:pic>
+      <p:pic>
+        <p:nvPicPr>
+          <p:cNvPr id="1026" name="Picture 2" descr="Know about Categorical Encoding, even New Ones! | by Ahmed Othmen | Towards  Data Science">
+            <a:extLst>
+              <a:ext uri="{FF2B5EF4-FFF2-40B4-BE49-F238E27FC236}">
+                <a16:creationId xmlns:a16="http://schemas.microsoft.com/office/drawing/2014/main" id="{D574EB78-1739-4BAC-B949-3948926DB887}"/>
+              </a:ext>
+            </a:extLst>
+          </p:cNvPr>
+          <p:cNvPicPr>
+            <a:picLocks noGrp="1" noChangeAspect="1" noChangeArrowheads="1"/>
+          </p:cNvPicPr>
+          <p:nvPr>
+            <p:ph sz="quarter" idx="4"/>
+          </p:nvPr>
+        </p:nvPicPr>
+        <p:blipFill>
+          <a:blip r:embed="rId3">
+            <a:extLst>
+              <a:ext uri="{28A0092B-C50C-407E-A947-70E740481C1C}">
+                <a14:useLocalDpi xmlns:a14="http://schemas.microsoft.com/office/drawing/2010/main" val="0"/>
+              </a:ext>
+            </a:extLst>
+          </a:blip>
+          <a:srcRect/>
+          <a:stretch>
+            <a:fillRect/>
+          </a:stretch>
+        </p:blipFill>
+        <p:spPr bwMode="auto">
+          <a:xfrm>
+            <a:off x="6194427" y="3111717"/>
+            <a:ext cx="4243201" cy="2482417"/>
+          </a:xfrm>
+          <a:prstGeom prst="rect">
+            <a:avLst/>
+          </a:prstGeom>
+          <a:noFill/>
+          <a:extLst>
+            <a:ext uri="{909E8E84-426E-40DD-AFC4-6F175D3DCCD1}">
+              <a14:hiddenFill xmlns:a14="http://schemas.microsoft.com/office/drawing/2010/main">
+                <a:solidFill>
+                  <a:srgbClr val="FFFFFF"/>
+                </a:solidFill>
+              </a14:hiddenFill>
+            </a:ext>
+          </a:extLst>
+        </p:spPr>
+      </p:pic>
+    </p:spTree>
+    <p:extLst>
+      <p:ext uri="{BB962C8B-B14F-4D97-AF65-F5344CB8AC3E}">
+        <p14:creationId xmlns:p14="http://schemas.microsoft.com/office/powerpoint/2010/main" val="1531299681"/>
+      </p:ext>
+    </p:extLst>
+  </p:cSld>
+  <p:clrMapOvr>
+    <a:masterClrMapping/>
+  </p:clrMapOvr>
+</p:sld>
+</file>
+
+<file path=ppt/slides/slide15.xml><?xml version="1.0" encoding="utf-8"?>
 <p:sld xmlns:a="http://schemas.openxmlformats.org/drawingml/2006/main" xmlns:r="http://schemas.openxmlformats.org/officeDocument/2006/relationships" xmlns:p="http://schemas.openxmlformats.org/presentationml/2006/main">
   <p:cSld>
     <p:spTree>

</xml_diff>

<commit_message>
create new notebook to do live session
</commit_message>
<xml_diff>
--- a/Data Preparation/slides/MSA-2021-introduction-to-data-science-data-preparation.pptx
+++ b/Data Preparation/slides/MSA-2021-introduction-to-data-science-data-preparation.pptx
@@ -14223,7 +14223,7 @@
 </file>
 
 <file path=ppt/slides/slide5.xml><?xml version="1.0" encoding="utf-8"?>
-<p:sld xmlns:a="http://schemas.openxmlformats.org/drawingml/2006/main" xmlns:r="http://schemas.openxmlformats.org/officeDocument/2006/relationships" xmlns:p="http://schemas.openxmlformats.org/presentationml/2006/main">
+<p:sld xmlns:a="http://schemas.openxmlformats.org/drawingml/2006/main" xmlns:r="http://schemas.openxmlformats.org/officeDocument/2006/relationships" xmlns:p="http://schemas.openxmlformats.org/presentationml/2006/main" show="0">
   <p:cSld>
     <p:spTree>
       <p:nvGrpSpPr>
@@ -14328,7 +14328,7 @@
 </file>
 
 <file path=ppt/slides/slide6.xml><?xml version="1.0" encoding="utf-8"?>
-<p:sld xmlns:a="http://schemas.openxmlformats.org/drawingml/2006/main" xmlns:r="http://schemas.openxmlformats.org/officeDocument/2006/relationships" xmlns:p="http://schemas.openxmlformats.org/presentationml/2006/main">
+<p:sld xmlns:a="http://schemas.openxmlformats.org/drawingml/2006/main" xmlns:r="http://schemas.openxmlformats.org/officeDocument/2006/relationships" xmlns:p="http://schemas.openxmlformats.org/presentationml/2006/main" show="0">
   <p:cSld>
     <p:spTree>
       <p:nvGrpSpPr>
@@ -14525,7 +14525,7 @@
 </file>
 
 <file path=ppt/slides/slide7.xml><?xml version="1.0" encoding="utf-8"?>
-<p:sld xmlns:a="http://schemas.openxmlformats.org/drawingml/2006/main" xmlns:r="http://schemas.openxmlformats.org/officeDocument/2006/relationships" xmlns:p="http://schemas.openxmlformats.org/presentationml/2006/main">
+<p:sld xmlns:a="http://schemas.openxmlformats.org/drawingml/2006/main" xmlns:r="http://schemas.openxmlformats.org/officeDocument/2006/relationships" xmlns:p="http://schemas.openxmlformats.org/presentationml/2006/main" show="0">
   <p:cSld>
     <p:spTree>
       <p:nvGrpSpPr>

</xml_diff>